<commit_message>
New figs for angular momentum lab
</commit_message>
<xml_diff>
--- a/StudentGuideModule1/ang_mom/ang_mom_fig3_new.pptx
+++ b/StudentGuideModule1/ang_mom/ang_mom_fig3_new.pptx
@@ -104,6 +104,11 @@
       </a:defRPr>
     </a:lvl9pPr>
   </p:defaultTextStyle>
+  <p:extLst>
+    <p:ext uri="{EFAFB233-063F-42B5-8137-9DF3F51BA10A}">
+      <p15:sldGuideLst xmlns:p15="http://schemas.microsoft.com/office/powerpoint/2012/main"/>
+    </p:ext>
+  </p:extLst>
 </p:presentation>
 </file>
 
@@ -238,7 +243,7 @@
           <a:p>
             <a:fld id="{2B6D4487-BA84-4B6A-8B9F-5ED309F37A77}" type="datetimeFigureOut">
               <a:rPr lang="en-US" smtClean="0"/>
-              <a:t>5/19/2016</a:t>
+              <a:t>5/21/2016</a:t>
             </a:fld>
             <a:endParaRPr lang="en-US"/>
           </a:p>
@@ -408,7 +413,7 @@
           <a:p>
             <a:fld id="{2B6D4487-BA84-4B6A-8B9F-5ED309F37A77}" type="datetimeFigureOut">
               <a:rPr lang="en-US" smtClean="0"/>
-              <a:t>5/19/2016</a:t>
+              <a:t>5/21/2016</a:t>
             </a:fld>
             <a:endParaRPr lang="en-US"/>
           </a:p>
@@ -588,7 +593,7 @@
           <a:p>
             <a:fld id="{2B6D4487-BA84-4B6A-8B9F-5ED309F37A77}" type="datetimeFigureOut">
               <a:rPr lang="en-US" smtClean="0"/>
-              <a:t>5/19/2016</a:t>
+              <a:t>5/21/2016</a:t>
             </a:fld>
             <a:endParaRPr lang="en-US"/>
           </a:p>
@@ -758,7 +763,7 @@
           <a:p>
             <a:fld id="{2B6D4487-BA84-4B6A-8B9F-5ED309F37A77}" type="datetimeFigureOut">
               <a:rPr lang="en-US" smtClean="0"/>
-              <a:t>5/19/2016</a:t>
+              <a:t>5/21/2016</a:t>
             </a:fld>
             <a:endParaRPr lang="en-US"/>
           </a:p>
@@ -1004,7 +1009,7 @@
           <a:p>
             <a:fld id="{2B6D4487-BA84-4B6A-8B9F-5ED309F37A77}" type="datetimeFigureOut">
               <a:rPr lang="en-US" smtClean="0"/>
-              <a:t>5/19/2016</a:t>
+              <a:t>5/21/2016</a:t>
             </a:fld>
             <a:endParaRPr lang="en-US"/>
           </a:p>
@@ -1236,7 +1241,7 @@
           <a:p>
             <a:fld id="{2B6D4487-BA84-4B6A-8B9F-5ED309F37A77}" type="datetimeFigureOut">
               <a:rPr lang="en-US" smtClean="0"/>
-              <a:t>5/19/2016</a:t>
+              <a:t>5/21/2016</a:t>
             </a:fld>
             <a:endParaRPr lang="en-US"/>
           </a:p>
@@ -1603,7 +1608,7 @@
           <a:p>
             <a:fld id="{2B6D4487-BA84-4B6A-8B9F-5ED309F37A77}" type="datetimeFigureOut">
               <a:rPr lang="en-US" smtClean="0"/>
-              <a:t>5/19/2016</a:t>
+              <a:t>5/21/2016</a:t>
             </a:fld>
             <a:endParaRPr lang="en-US"/>
           </a:p>
@@ -1721,7 +1726,7 @@
           <a:p>
             <a:fld id="{2B6D4487-BA84-4B6A-8B9F-5ED309F37A77}" type="datetimeFigureOut">
               <a:rPr lang="en-US" smtClean="0"/>
-              <a:t>5/19/2016</a:t>
+              <a:t>5/21/2016</a:t>
             </a:fld>
             <a:endParaRPr lang="en-US"/>
           </a:p>
@@ -1816,7 +1821,7 @@
           <a:p>
             <a:fld id="{2B6D4487-BA84-4B6A-8B9F-5ED309F37A77}" type="datetimeFigureOut">
               <a:rPr lang="en-US" smtClean="0"/>
-              <a:t>5/19/2016</a:t>
+              <a:t>5/21/2016</a:t>
             </a:fld>
             <a:endParaRPr lang="en-US"/>
           </a:p>
@@ -2093,7 +2098,7 @@
           <a:p>
             <a:fld id="{2B6D4487-BA84-4B6A-8B9F-5ED309F37A77}" type="datetimeFigureOut">
               <a:rPr lang="en-US" smtClean="0"/>
-              <a:t>5/19/2016</a:t>
+              <a:t>5/21/2016</a:t>
             </a:fld>
             <a:endParaRPr lang="en-US"/>
           </a:p>
@@ -2346,7 +2351,7 @@
           <a:p>
             <a:fld id="{2B6D4487-BA84-4B6A-8B9F-5ED309F37A77}" type="datetimeFigureOut">
               <a:rPr lang="en-US" smtClean="0"/>
-              <a:t>5/19/2016</a:t>
+              <a:t>5/21/2016</a:t>
             </a:fld>
             <a:endParaRPr lang="en-US"/>
           </a:p>
@@ -2559,7 +2564,7 @@
           <a:p>
             <a:fld id="{2B6D4487-BA84-4B6A-8B9F-5ED309F37A77}" type="datetimeFigureOut">
               <a:rPr lang="en-US" smtClean="0"/>
-              <a:t>5/19/2016</a:t>
+              <a:t>5/21/2016</a:t>
             </a:fld>
             <a:endParaRPr lang="en-US"/>
           </a:p>
@@ -3078,17 +3083,17 @@
         </p:nvCxnSpPr>
         <p:spPr>
           <a:xfrm flipV="1">
-            <a:off x="3368766" y="1976846"/>
-            <a:ext cx="0" cy="1184365"/>
+            <a:off x="3368766" y="2342606"/>
+            <a:ext cx="0" cy="818606"/>
           </a:xfrm>
           <a:prstGeom prst="straightConnector1">
             <a:avLst/>
           </a:prstGeom>
-          <a:ln>
+          <a:ln w="19050">
             <a:solidFill>
               <a:schemeClr val="tx1"/>
             </a:solidFill>
-            <a:tailEnd type="triangle"/>
+            <a:tailEnd type="stealth" w="med" len="lg"/>
           </a:ln>
         </p:spPr>
         <p:style>
@@ -3431,7 +3436,7 @@
             </p:nvSpPr>
             <p:spPr>
               <a:xfrm>
-                <a:off x="3062174" y="2105158"/>
+                <a:off x="3105719" y="2418668"/>
                 <a:ext cx="345871" cy="276999"/>
               </a:xfrm>
               <a:prstGeom prst="rect">
@@ -3445,6 +3450,7 @@
               </a:bodyPr>
               <a:lstStyle/>
               <a:p>
+                <a:pPr/>
                 <a14:m>
                   <m:oMathPara xmlns:m="http://schemas.openxmlformats.org/officeDocument/2006/math">
                     <m:oMathParaPr>
@@ -3488,7 +3494,7 @@
             </p:nvSpPr>
             <p:spPr>
               <a:xfrm>
-                <a:off x="3062174" y="2105158"/>
+                <a:off x="3105719" y="2418668"/>
                 <a:ext cx="345871" cy="276999"/>
               </a:xfrm>
               <a:prstGeom prst="rect">
@@ -3497,7 +3503,7 @@
               <a:blipFill>
                 <a:blip r:embed="rId2"/>
                 <a:stretch>
-                  <a:fillRect t="-2174" r="-10526"/>
+                  <a:fillRect t="-2222" r="-10526"/>
                 </a:stretch>
               </a:blipFill>
             </p:spPr>
@@ -3516,8 +3522,8 @@
           </p:sp>
         </mc:Fallback>
       </mc:AlternateContent>
-      <mc:AlternateContent xmlns:mc="http://schemas.openxmlformats.org/markup-compatibility/2006">
-        <mc:Choice xmlns:a14="http://schemas.microsoft.com/office/drawing/2010/main" Requires="a14">
+      <mc:AlternateContent xmlns:mc="http://schemas.openxmlformats.org/markup-compatibility/2006" xmlns:a14="http://schemas.microsoft.com/office/drawing/2010/main">
+        <mc:Choice Requires="a14">
           <p:sp>
             <p:nvSpPr>
               <p:cNvPr id="26" name="TextBox 25"/>
@@ -3540,6 +3546,7 @@
               </a:bodyPr>
               <a:lstStyle/>
               <a:p>
+                <a:pPr/>
                 <a14:m>
                   <m:oMathPara xmlns:m="http://schemas.openxmlformats.org/officeDocument/2006/math">
                     <m:oMathParaPr>
@@ -3572,7 +3579,7 @@
             </p:txBody>
           </p:sp>
         </mc:Choice>
-        <mc:Fallback>
+        <mc:Fallback xmlns="">
           <p:sp>
             <p:nvSpPr>
               <p:cNvPr id="26" name="TextBox 25"/>
@@ -3611,8 +3618,8 @@
           </p:sp>
         </mc:Fallback>
       </mc:AlternateContent>
-      <mc:AlternateContent xmlns:mc="http://schemas.openxmlformats.org/markup-compatibility/2006">
-        <mc:Choice xmlns:a14="http://schemas.microsoft.com/office/drawing/2010/main" Requires="a14">
+      <mc:AlternateContent xmlns:mc="http://schemas.openxmlformats.org/markup-compatibility/2006" xmlns:a14="http://schemas.microsoft.com/office/drawing/2010/main">
+        <mc:Choice Requires="a14">
           <p:sp>
             <p:nvSpPr>
               <p:cNvPr id="27" name="TextBox 26"/>
@@ -3635,6 +3642,7 @@
               </a:bodyPr>
               <a:lstStyle/>
               <a:p>
+                <a:pPr/>
                 <a14:m>
                   <m:oMathPara xmlns:m="http://schemas.openxmlformats.org/officeDocument/2006/math">
                     <m:oMathParaPr>
@@ -3667,7 +3675,7 @@
             </p:txBody>
           </p:sp>
         </mc:Choice>
-        <mc:Fallback>
+        <mc:Fallback xmlns="">
           <p:sp>
             <p:nvSpPr>
               <p:cNvPr id="27" name="TextBox 26"/>
@@ -3706,8 +3714,8 @@
           </p:sp>
         </mc:Fallback>
       </mc:AlternateContent>
-      <mc:AlternateContent xmlns:mc="http://schemas.openxmlformats.org/markup-compatibility/2006">
-        <mc:Choice xmlns:a14="http://schemas.microsoft.com/office/drawing/2010/main" Requires="a14">
+      <mc:AlternateContent xmlns:mc="http://schemas.openxmlformats.org/markup-compatibility/2006" xmlns:a14="http://schemas.microsoft.com/office/drawing/2010/main">
+        <mc:Choice Requires="a14">
           <p:sp>
             <p:nvSpPr>
               <p:cNvPr id="28" name="TextBox 27"/>
@@ -3761,7 +3769,7 @@
             </p:txBody>
           </p:sp>
         </mc:Choice>
-        <mc:Fallback>
+        <mc:Fallback xmlns="">
           <p:sp>
             <p:nvSpPr>
               <p:cNvPr id="28" name="TextBox 27"/>
@@ -3800,8 +3808,8 @@
           </p:sp>
         </mc:Fallback>
       </mc:AlternateContent>
-      <mc:AlternateContent xmlns:mc="http://schemas.openxmlformats.org/markup-compatibility/2006">
-        <mc:Choice xmlns:a14="http://schemas.microsoft.com/office/drawing/2010/main" Requires="a14">
+      <mc:AlternateContent xmlns:mc="http://schemas.openxmlformats.org/markup-compatibility/2006" xmlns:a14="http://schemas.microsoft.com/office/drawing/2010/main">
+        <mc:Choice Requires="a14">
           <p:sp>
             <p:nvSpPr>
               <p:cNvPr id="29" name="TextBox 28"/>
@@ -3855,7 +3863,7 @@
             </p:txBody>
           </p:sp>
         </mc:Choice>
-        <mc:Fallback>
+        <mc:Fallback xmlns="">
           <p:sp>
             <p:nvSpPr>
               <p:cNvPr id="29" name="TextBox 28"/>

</xml_diff>